<commit_message>
Update DB Performance Presentation
</commit_message>
<xml_diff>
--- a/Databases/11. Database Performance/Database-Performance-for-Developers.pptx
+++ b/Databases/11. Database Performance/Database-Performance-for-Developers.pptx
@@ -259,7 +259,7 @@
   </p:defaultTextStyle>
   <p:extLst>
     <p:ext uri="{EFAFB233-063F-42B5-8137-9DF3F51BA10A}">
-      <p15:sldGuideLst xmlns:p15="http://schemas.microsoft.com/office/powerpoint/2012/main" xmlns="">
+      <p15:sldGuideLst xmlns:p15="http://schemas.microsoft.com/office/powerpoint/2012/main">
         <p15:guide id="1" orient="horz" pos="2160">
           <p15:clr>
             <a:srgbClr val="A4A3A4"/>
@@ -273,7 +273,7 @@
       </p15:sldGuideLst>
     </p:ext>
     <p:ext uri="{2D200454-40CA-4A62-9FC3-DE9A4176ACB9}">
-      <p15:notesGuideLst xmlns:p15="http://schemas.microsoft.com/office/powerpoint/2012/main" xmlns="">
+      <p15:notesGuideLst xmlns:p15="http://schemas.microsoft.com/office/powerpoint/2012/main">
         <p15:guide id="1" orient="horz" pos="3126">
           <p15:clr>
             <a:srgbClr val="A4A3A4"/>
@@ -466,7 +466,7 @@
             <a:fld id="{FEA767D5-DE47-4989-A0A5-C3AE0DF1E420}" type="datetime1">
               <a:rPr lang="en-US"/>
               <a:pPr/>
-              <a:t>17-07-2013</a:t>
+              <a:t>8/28/2014</a:t>
             </a:fld>
             <a:endParaRPr lang="bg-BG"/>
           </a:p>
@@ -823,7 +823,7 @@
             <a:fld id="{594C6D40-BCC7-428A-B2A2-A9BEDD2F1EB0}" type="datetime1">
               <a:rPr lang="en-US"/>
               <a:pPr/>
-              <a:t>17-07-2013</a:t>
+              <a:t>8/28/2014</a:t>
             </a:fld>
             <a:r>
               <a:rPr lang="en-US"/>
@@ -1554,6 +1554,169 @@
     <p:extLst>
       <p:ext uri="{BB962C8B-B14F-4D97-AF65-F5344CB8AC3E}">
         <p14:creationId xmlns:p14="http://schemas.microsoft.com/office/powerpoint/2010/main" val="1274048687"/>
+      </p:ext>
+    </p:extLst>
+  </p:cSld>
+  <p:clrMapOvr>
+    <a:masterClrMapping/>
+  </p:clrMapOvr>
+</p:notes>
+</file>
+
+<file path=ppt/notesSlides/notesSlide3.xml><?xml version="1.0" encoding="utf-8"?>
+<p:notes xmlns:a="http://schemas.openxmlformats.org/drawingml/2006/main" xmlns:r="http://schemas.openxmlformats.org/officeDocument/2006/relationships" xmlns:p="http://schemas.openxmlformats.org/presentationml/2006/main">
+  <p:cSld>
+    <p:spTree>
+      <p:nvGrpSpPr>
+        <p:cNvPr id="1" name=""/>
+        <p:cNvGrpSpPr/>
+        <p:nvPr/>
+      </p:nvGrpSpPr>
+      <p:grpSpPr>
+        <a:xfrm>
+          <a:off x="0" y="0"/>
+          <a:ext cx="0" cy="0"/>
+          <a:chOff x="0" y="0"/>
+          <a:chExt cx="0" cy="0"/>
+        </a:xfrm>
+      </p:grpSpPr>
+      <p:sp>
+        <p:nvSpPr>
+          <p:cNvPr id="2" name="Slide Image Placeholder 1"/>
+          <p:cNvSpPr>
+            <a:spLocks noGrp="1" noRot="1" noChangeAspect="1"/>
+          </p:cNvSpPr>
+          <p:nvPr>
+            <p:ph type="sldImg"/>
+          </p:nvPr>
+        </p:nvSpPr>
+        <p:spPr/>
+      </p:sp>
+      <p:sp>
+        <p:nvSpPr>
+          <p:cNvPr id="3" name="Notes Placeholder 2"/>
+          <p:cNvSpPr>
+            <a:spLocks noGrp="1"/>
+          </p:cNvSpPr>
+          <p:nvPr>
+            <p:ph type="body" idx="1"/>
+          </p:nvPr>
+        </p:nvSpPr>
+        <p:spPr/>
+        <p:txBody>
+          <a:bodyPr/>
+          <a:lstStyle/>
+          <a:p>
+            <a:endParaRPr lang="en-US" dirty="0"/>
+          </a:p>
+        </p:txBody>
+      </p:sp>
+      <p:sp>
+        <p:nvSpPr>
+          <p:cNvPr id="4" name="Header Placeholder 3"/>
+          <p:cNvSpPr>
+            <a:spLocks noGrp="1"/>
+          </p:cNvSpPr>
+          <p:nvPr>
+            <p:ph type="hdr" sz="quarter" idx="10"/>
+          </p:nvPr>
+        </p:nvSpPr>
+        <p:spPr/>
+        <p:txBody>
+          <a:bodyPr/>
+          <a:lstStyle/>
+          <a:p>
+            <a:r>
+              <a:rPr lang="en-US" smtClean="0"/>
+              <a:t>*</a:t>
+            </a:r>
+            <a:endParaRPr lang="en-US" sz="1200" i="0"/>
+          </a:p>
+        </p:txBody>
+      </p:sp>
+      <p:sp>
+        <p:nvSpPr>
+          <p:cNvPr id="5" name="Date Placeholder 4"/>
+          <p:cNvSpPr>
+            <a:spLocks noGrp="1"/>
+          </p:cNvSpPr>
+          <p:nvPr>
+            <p:ph type="dt" idx="11"/>
+          </p:nvPr>
+        </p:nvSpPr>
+        <p:spPr/>
+        <p:txBody>
+          <a:bodyPr/>
+          <a:lstStyle/>
+          <a:p>
+            <a:fld id="{594C6D40-BCC7-428A-B2A2-A9BEDD2F1EB0}" type="datetime1">
+              <a:rPr lang="en-US" smtClean="0"/>
+              <a:pPr/>
+              <a:t>8/28/2014</a:t>
+            </a:fld>
+            <a:r>
+              <a:rPr lang="en-US" smtClean="0"/>
+              <a:t>07/16/96</a:t>
+            </a:r>
+            <a:endParaRPr lang="en-US" sz="1200" i="0"/>
+          </a:p>
+        </p:txBody>
+      </p:sp>
+      <p:sp>
+        <p:nvSpPr>
+          <p:cNvPr id="6" name="Footer Placeholder 5"/>
+          <p:cNvSpPr>
+            <a:spLocks noGrp="1"/>
+          </p:cNvSpPr>
+          <p:nvPr>
+            <p:ph type="ftr" sz="quarter" idx="12"/>
+          </p:nvPr>
+        </p:nvSpPr>
+        <p:spPr/>
+        <p:txBody>
+          <a:bodyPr/>
+          <a:lstStyle/>
+          <a:p>
+            <a:r>
+              <a:rPr lang="en-US" smtClean="0"/>
+              <a:t>(c) 2005 National Academy for Software Development - http://academy.devbg.org. All rights reserved. Unauthorized copying or re-distribution is strictly prohibited.*</a:t>
+            </a:r>
+            <a:endParaRPr lang="en-US" sz="1200" i="0"/>
+          </a:p>
+        </p:txBody>
+      </p:sp>
+      <p:sp>
+        <p:nvSpPr>
+          <p:cNvPr id="7" name="Slide Number Placeholder 6"/>
+          <p:cNvSpPr>
+            <a:spLocks noGrp="1"/>
+          </p:cNvSpPr>
+          <p:nvPr>
+            <p:ph type="sldNum" sz="quarter" idx="13"/>
+          </p:nvPr>
+        </p:nvSpPr>
+        <p:spPr/>
+        <p:txBody>
+          <a:bodyPr/>
+          <a:lstStyle/>
+          <a:p>
+            <a:fld id="{59DD3417-B363-4284-A16D-67F320162AFD}" type="slidenum">
+              <a:rPr lang="en-US" smtClean="0"/>
+              <a:pPr/>
+              <a:t>33</a:t>
+            </a:fld>
+            <a:r>
+              <a:rPr lang="en-US" smtClean="0"/>
+              <a:t>##</a:t>
+            </a:r>
+            <a:endParaRPr lang="en-US" sz="1200" i="0"/>
+          </a:p>
+        </p:txBody>
+      </p:sp>
+    </p:spTree>
+    <p:extLst>
+      <p:ext uri="{BB962C8B-B14F-4D97-AF65-F5344CB8AC3E}">
+        <p14:creationId xmlns:p14="http://schemas.microsoft.com/office/powerpoint/2010/main" val="947685137"/>
       </p:ext>
     </p:extLst>
   </p:cSld>
@@ -6792,140 +6955,6 @@
           </a:p>
         </p:txBody>
       </p:sp>
-      <p:sp>
-        <p:nvSpPr>
-          <p:cNvPr id="6" name="Text Placeholder 5"/>
-          <p:cNvSpPr>
-            <a:spLocks noGrp="1"/>
-          </p:cNvSpPr>
-          <p:nvPr>
-            <p:ph type="body" sz="quarter" idx="10"/>
-          </p:nvPr>
-        </p:nvSpPr>
-        <p:spPr>
-          <a:xfrm>
-            <a:off x="444500" y="4509120"/>
-            <a:ext cx="3352800" cy="533400"/>
-          </a:xfrm>
-        </p:spPr>
-        <p:txBody>
-          <a:bodyPr/>
-          <a:lstStyle/>
-          <a:p>
-            <a:r>
-              <a:rPr lang="en-US" dirty="0" smtClean="0"/>
-              <a:t>Svetlin Nakov</a:t>
-            </a:r>
-            <a:endParaRPr lang="en-US" dirty="0"/>
-          </a:p>
-        </p:txBody>
-      </p:sp>
-      <p:sp>
-        <p:nvSpPr>
-          <p:cNvPr id="7" name="Text Placeholder 6"/>
-          <p:cNvSpPr>
-            <a:spLocks noGrp="1"/>
-          </p:cNvSpPr>
-          <p:nvPr>
-            <p:ph type="body" sz="quarter" idx="11"/>
-          </p:nvPr>
-        </p:nvSpPr>
-        <p:spPr/>
-        <p:txBody>
-          <a:bodyPr/>
-          <a:lstStyle/>
-          <a:p>
-            <a:r>
-              <a:rPr lang="en-US" dirty="0" smtClean="0"/>
-              <a:t>Telerik Software Academy</a:t>
-            </a:r>
-            <a:endParaRPr lang="en-US" dirty="0"/>
-          </a:p>
-        </p:txBody>
-      </p:sp>
-      <p:sp>
-        <p:nvSpPr>
-          <p:cNvPr id="8" name="Text Placeholder 7"/>
-          <p:cNvSpPr>
-            <a:spLocks noGrp="1"/>
-          </p:cNvSpPr>
-          <p:nvPr>
-            <p:ph type="body" sz="quarter" idx="12"/>
-          </p:nvPr>
-        </p:nvSpPr>
-        <p:spPr/>
-        <p:txBody>
-          <a:bodyPr/>
-          <a:lstStyle/>
-          <a:p>
-            <a:r>
-              <a:rPr lang="en-US" dirty="0" smtClean="0">
-                <a:hlinkClick r:id="rId2"/>
-              </a:rPr>
-              <a:t>http://academy.telerik.com</a:t>
-            </a:r>
-            <a:endParaRPr lang="en-US" dirty="0"/>
-          </a:p>
-        </p:txBody>
-      </p:sp>
-      <p:sp>
-        <p:nvSpPr>
-          <p:cNvPr id="9" name="Text Placeholder 8"/>
-          <p:cNvSpPr>
-            <a:spLocks noGrp="1"/>
-          </p:cNvSpPr>
-          <p:nvPr>
-            <p:ph type="body" sz="quarter" idx="13"/>
-          </p:nvPr>
-        </p:nvSpPr>
-        <p:spPr>
-          <a:xfrm>
-            <a:off x="457200" y="4966320"/>
-            <a:ext cx="3352800" cy="400110"/>
-          </a:xfrm>
-        </p:spPr>
-        <p:txBody>
-          <a:bodyPr/>
-          <a:lstStyle/>
-          <a:p>
-            <a:r>
-              <a:rPr lang="en-US" sz="2000" dirty="0" smtClean="0"/>
-              <a:t>Manager Technical Training</a:t>
-            </a:r>
-            <a:endParaRPr lang="en-US" sz="2000" dirty="0"/>
-          </a:p>
-        </p:txBody>
-      </p:sp>
-      <p:sp>
-        <p:nvSpPr>
-          <p:cNvPr id="10" name="Text Placeholder 9"/>
-          <p:cNvSpPr>
-            <a:spLocks noGrp="1"/>
-          </p:cNvSpPr>
-          <p:nvPr>
-            <p:ph type="body" sz="quarter" idx="14"/>
-          </p:nvPr>
-        </p:nvSpPr>
-        <p:spPr>
-          <a:xfrm>
-            <a:off x="457200" y="5310336"/>
-            <a:ext cx="3352800" cy="369332"/>
-          </a:xfrm>
-        </p:spPr>
-        <p:txBody>
-          <a:bodyPr/>
-          <a:lstStyle/>
-          <a:p>
-            <a:r>
-              <a:rPr lang="en-US" sz="1800" smtClean="0">
-                <a:hlinkClick r:id="rId3"/>
-              </a:rPr>
-              <a:t>http://www.nakov.com</a:t>
-            </a:r>
-            <a:endParaRPr lang="en-US" sz="1800" dirty="0"/>
-          </a:p>
-        </p:txBody>
-      </p:sp>
       <p:pic>
         <p:nvPicPr>
           <p:cNvPr id="2" name="Picture 2" descr="http://www.organisationscience.com/styled-6/files/dt-improved-performance.jpg"/>
@@ -6935,7 +6964,7 @@
           <p:nvPr/>
         </p:nvPicPr>
         <p:blipFill>
-          <a:blip r:embed="rId4" cstate="print">
+          <a:blip r:embed="rId2" cstate="print">
             <a:extLst>
               <a:ext uri="{28A0092B-C50C-407E-A947-70E740481C1C}">
                 <a14:useLocalDpi xmlns:a14="http://schemas.microsoft.com/office/drawing/2010/main" val="0"/>
@@ -6976,7 +7005,7 @@
           <p:nvPr/>
         </p:nvPicPr>
         <p:blipFill>
-          <a:blip r:embed="rId5" cstate="print">
+          <a:blip r:embed="rId3" cstate="print">
             <a:extLst>
               <a:ext uri="{28A0092B-C50C-407E-A947-70E740481C1C}">
                 <a14:useLocalDpi xmlns:a14="http://schemas.microsoft.com/office/drawing/2010/main" val="0"/>
@@ -7017,7 +7046,7 @@
           <p:nvPr/>
         </p:nvPicPr>
         <p:blipFill>
-          <a:blip r:embed="rId6">
+          <a:blip r:embed="rId4">
             <a:extLst>
               <a:ext uri="{28A0092B-C50C-407E-A947-70E740481C1C}">
                 <a14:useLocalDpi xmlns:a14="http://schemas.microsoft.com/office/drawing/2010/main" val="0"/>
@@ -7060,11 +7089,11 @@
           <p:nvPr/>
         </p:nvPicPr>
         <p:blipFill>
-          <a:blip r:embed="rId7">
+          <a:blip r:embed="rId5">
             <a:extLst>
               <a:ext uri="{BEBA8EAE-BF5A-486C-A8C5-ECC9F3942E4B}">
                 <a14:imgProps xmlns:a14="http://schemas.microsoft.com/office/drawing/2010/main">
-                  <a14:imgLayer r:embed="rId8">
+                  <a14:imgLayer r:embed="rId6">
                     <a14:imgEffect>
                       <a14:saturation sat="400000"/>
                     </a14:imgEffect>
@@ -7110,7 +7139,7 @@
           <p:nvPr/>
         </p:nvPicPr>
         <p:blipFill>
-          <a:blip r:embed="rId9">
+          <a:blip r:embed="rId7">
             <a:extLst>
               <a:ext uri="{28A0092B-C50C-407E-A947-70E740481C1C}">
                 <a14:useLocalDpi xmlns:a14="http://schemas.microsoft.com/office/drawing/2010/main"/>
@@ -7229,6 +7258,817 @@
                 </a:outerShdw>
               </a:effectLst>
             </a:endParaRPr>
+          </a:p>
+        </p:txBody>
+      </p:sp>
+      <p:sp>
+        <p:nvSpPr>
+          <p:cNvPr id="20" name="Text Placeholder 6"/>
+          <p:cNvSpPr>
+            <a:spLocks noGrp="1"/>
+          </p:cNvSpPr>
+          <p:nvPr/>
+        </p:nvSpPr>
+        <p:spPr>
+          <a:xfrm>
+            <a:off x="429086" y="5726668"/>
+            <a:ext cx="3990513" cy="400110"/>
+          </a:xfrm>
+          <a:prstGeom prst="rect">
+            <a:avLst/>
+          </a:prstGeom>
+          <a:noFill/>
+        </p:spPr>
+        <p:txBody>
+          <a:bodyPr wrap="square" rtlCol="0">
+            <a:spAutoFit/>
+          </a:bodyPr>
+          <a:lstStyle>
+            <a:lvl1pPr marL="319088" indent="-319088" algn="l" rtl="0" eaLnBrk="0" fontAlgn="base" hangingPunct="0">
+              <a:spcBef>
+                <a:spcPct val="20000"/>
+              </a:spcBef>
+              <a:spcAft>
+                <a:spcPct val="0"/>
+              </a:spcAft>
+              <a:buClr>
+                <a:schemeClr val="accent5">
+                  <a:lumMod val="40000"/>
+                  <a:lumOff val="60000"/>
+                </a:schemeClr>
+              </a:buClr>
+              <a:buSzPct val="70000"/>
+              <a:buFont typeface="Wingdings 2" pitchFamily="18" charset="2"/>
+              <a:buNone/>
+              <a:defRPr lang="en-US" sz="2000" b="1" kern="1200" dirty="0">
+                <a:solidFill>
+                  <a:schemeClr val="tx2">
+                    <a:lumMod val="20000"/>
+                    <a:lumOff val="80000"/>
+                  </a:schemeClr>
+                </a:solidFill>
+                <a:effectLst>
+                  <a:outerShdw blurRad="38100" dist="38100" dir="2700000" algn="tl">
+                    <a:srgbClr val="000000">
+                      <a:alpha val="43137"/>
+                    </a:srgbClr>
+                  </a:outerShdw>
+                </a:effectLst>
+                <a:latin typeface="Corbel" pitchFamily="34" charset="0"/>
+                <a:ea typeface="+mn-ea"/>
+                <a:cs typeface="+mn-cs"/>
+              </a:defRPr>
+            </a:lvl1pPr>
+            <a:lvl2pPr marL="630238" indent="-273050" algn="l" rtl="0" eaLnBrk="0" fontAlgn="base" hangingPunct="0">
+              <a:spcBef>
+                <a:spcPct val="20000"/>
+              </a:spcBef>
+              <a:spcAft>
+                <a:spcPct val="0"/>
+              </a:spcAft>
+              <a:buClr>
+                <a:schemeClr val="accent2">
+                  <a:lumMod val="60000"/>
+                  <a:lumOff val="40000"/>
+                </a:schemeClr>
+              </a:buClr>
+              <a:buFont typeface="Wingdings 2" pitchFamily="18" charset="2"/>
+              <a:buChar char=""/>
+              <a:defRPr sz="3000" b="1" kern="1200">
+                <a:solidFill>
+                  <a:schemeClr val="tx1">
+                    <a:lumMod val="20000"/>
+                    <a:lumOff val="80000"/>
+                  </a:schemeClr>
+                </a:solidFill>
+                <a:effectLst>
+                  <a:outerShdw blurRad="38100" dist="38100" dir="2700000" algn="tl">
+                    <a:srgbClr val="000000">
+                      <a:alpha val="43137"/>
+                    </a:srgbClr>
+                  </a:outerShdw>
+                </a:effectLst>
+                <a:latin typeface="+mn-lt"/>
+                <a:ea typeface="+mn-ea"/>
+                <a:cs typeface="+mn-cs"/>
+              </a:defRPr>
+            </a:lvl2pPr>
+            <a:lvl3pPr marL="922338" indent="-273050" algn="l" rtl="0" eaLnBrk="0" fontAlgn="base" hangingPunct="0">
+              <a:spcBef>
+                <a:spcPct val="20000"/>
+              </a:spcBef>
+              <a:spcAft>
+                <a:spcPct val="0"/>
+              </a:spcAft>
+              <a:buClr>
+                <a:schemeClr val="tx1">
+                  <a:lumMod val="50000"/>
+                </a:schemeClr>
+              </a:buClr>
+              <a:buFont typeface="Wingdings 2" pitchFamily="18" charset="2"/>
+              <a:buChar char=""/>
+              <a:defRPr sz="2800" b="1" kern="1200">
+                <a:solidFill>
+                  <a:schemeClr val="tx1">
+                    <a:lumMod val="20000"/>
+                    <a:lumOff val="80000"/>
+                  </a:schemeClr>
+                </a:solidFill>
+                <a:effectLst>
+                  <a:outerShdw blurRad="38100" dist="38100" dir="2700000" algn="tl">
+                    <a:srgbClr val="000000">
+                      <a:alpha val="43137"/>
+                    </a:srgbClr>
+                  </a:outerShdw>
+                </a:effectLst>
+                <a:latin typeface="+mn-lt"/>
+                <a:ea typeface="+mn-ea"/>
+                <a:cs typeface="+mn-cs"/>
+              </a:defRPr>
+            </a:lvl3pPr>
+            <a:lvl4pPr marL="1187450" indent="-228600" algn="l" rtl="0" eaLnBrk="0" fontAlgn="base" hangingPunct="0">
+              <a:spcBef>
+                <a:spcPct val="20000"/>
+              </a:spcBef>
+              <a:spcAft>
+                <a:spcPct val="0"/>
+              </a:spcAft>
+              <a:buClr>
+                <a:srgbClr val="F8BD52"/>
+              </a:buClr>
+              <a:buFont typeface="Wingdings 2" pitchFamily="18" charset="2"/>
+              <a:buChar char=""/>
+              <a:defRPr sz="2600" b="1" kern="1200">
+                <a:solidFill>
+                  <a:schemeClr val="tx1">
+                    <a:lumMod val="20000"/>
+                    <a:lumOff val="80000"/>
+                  </a:schemeClr>
+                </a:solidFill>
+                <a:effectLst>
+                  <a:outerShdw blurRad="38100" dist="38100" dir="2700000" algn="tl">
+                    <a:srgbClr val="000000">
+                      <a:alpha val="43137"/>
+                    </a:srgbClr>
+                  </a:outerShdw>
+                </a:effectLst>
+                <a:latin typeface="+mn-lt"/>
+                <a:ea typeface="+mn-ea"/>
+                <a:cs typeface="+mn-cs"/>
+              </a:defRPr>
+            </a:lvl4pPr>
+            <a:lvl5pPr marL="1425575" indent="-228600" algn="l" rtl="0" eaLnBrk="0" fontAlgn="base" hangingPunct="0">
+              <a:spcBef>
+                <a:spcPct val="20000"/>
+              </a:spcBef>
+              <a:spcAft>
+                <a:spcPct val="0"/>
+              </a:spcAft>
+              <a:buClr>
+                <a:srgbClr val="46A6BD"/>
+              </a:buClr>
+              <a:buFont typeface="Wingdings 2" pitchFamily="18" charset="2"/>
+              <a:buChar char=""/>
+              <a:defRPr sz="2400" b="1" kern="1200">
+                <a:solidFill>
+                  <a:schemeClr val="tx1">
+                    <a:lumMod val="20000"/>
+                    <a:lumOff val="80000"/>
+                  </a:schemeClr>
+                </a:solidFill>
+                <a:effectLst>
+                  <a:outerShdw blurRad="38100" dist="38100" dir="2700000" algn="tl">
+                    <a:srgbClr val="000000">
+                      <a:alpha val="43137"/>
+                    </a:srgbClr>
+                  </a:outerShdw>
+                </a:effectLst>
+                <a:latin typeface="+mn-lt"/>
+                <a:ea typeface="+mn-ea"/>
+                <a:cs typeface="+mn-cs"/>
+              </a:defRPr>
+            </a:lvl5pPr>
+            <a:lvl6pPr marL="1673352" indent="-228600" algn="l" rtl="0" eaLnBrk="1" latinLnBrk="0" hangingPunct="1">
+              <a:spcBef>
+                <a:spcPct val="20000"/>
+              </a:spcBef>
+              <a:buClr>
+                <a:schemeClr val="accent6"/>
+              </a:buClr>
+              <a:buFont typeface="Wingdings 2"/>
+              <a:buChar char=""/>
+              <a:defRPr sz="1800" kern="1200">
+                <a:solidFill>
+                  <a:schemeClr val="tx1"/>
+                </a:solidFill>
+                <a:latin typeface="+mn-lt"/>
+                <a:ea typeface="+mn-ea"/>
+                <a:cs typeface="+mn-cs"/>
+              </a:defRPr>
+            </a:lvl6pPr>
+            <a:lvl7pPr marL="1911096" indent="-228600" algn="l" rtl="0" eaLnBrk="1" latinLnBrk="0" hangingPunct="1">
+              <a:spcBef>
+                <a:spcPct val="20000"/>
+              </a:spcBef>
+              <a:buClr>
+                <a:schemeClr val="tx2"/>
+              </a:buClr>
+              <a:buFont typeface="Wingdings 2"/>
+              <a:buChar char=""/>
+              <a:defRPr sz="1600" kern="1200">
+                <a:solidFill>
+                  <a:schemeClr val="tx1"/>
+                </a:solidFill>
+                <a:latin typeface="+mn-lt"/>
+                <a:ea typeface="+mn-ea"/>
+                <a:cs typeface="+mn-cs"/>
+              </a:defRPr>
+            </a:lvl7pPr>
+            <a:lvl8pPr marL="2121408" indent="-182880" algn="l" rtl="0" eaLnBrk="1" latinLnBrk="0" hangingPunct="1">
+              <a:spcBef>
+                <a:spcPct val="20000"/>
+              </a:spcBef>
+              <a:buClr>
+                <a:schemeClr val="tx2"/>
+              </a:buClr>
+              <a:buFont typeface="Wingdings 2"/>
+              <a:buChar char=""/>
+              <a:defRPr sz="1400" kern="1200">
+                <a:solidFill>
+                  <a:schemeClr val="tx1"/>
+                </a:solidFill>
+                <a:latin typeface="+mn-lt"/>
+                <a:ea typeface="+mn-ea"/>
+                <a:cs typeface="+mn-cs"/>
+              </a:defRPr>
+            </a:lvl8pPr>
+            <a:lvl9pPr marL="2322576" indent="-182880" algn="l" rtl="0" eaLnBrk="1" latinLnBrk="0" hangingPunct="1">
+              <a:spcBef>
+                <a:spcPct val="20000"/>
+              </a:spcBef>
+              <a:buClr>
+                <a:schemeClr val="tx2"/>
+              </a:buClr>
+              <a:buFont typeface="Wingdings 2"/>
+              <a:buChar char=""/>
+              <a:defRPr sz="1400" kern="1200">
+                <a:solidFill>
+                  <a:schemeClr val="tx1"/>
+                </a:solidFill>
+                <a:latin typeface="+mn-lt"/>
+                <a:ea typeface="+mn-ea"/>
+                <a:cs typeface="+mn-cs"/>
+              </a:defRPr>
+            </a:lvl9pPr>
+          </a:lstStyle>
+          <a:p>
+            <a:r>
+              <a:rPr lang="en-US" dirty="0"/>
+              <a:t>Telerik Software Academy</a:t>
+            </a:r>
+          </a:p>
+        </p:txBody>
+      </p:sp>
+      <p:sp>
+        <p:nvSpPr>
+          <p:cNvPr id="21" name="Text Placeholder 7"/>
+          <p:cNvSpPr>
+            <a:spLocks noGrp="1"/>
+          </p:cNvSpPr>
+          <p:nvPr/>
+        </p:nvSpPr>
+        <p:spPr>
+          <a:xfrm>
+            <a:off x="429087" y="6031468"/>
+            <a:ext cx="3990513" cy="369332"/>
+          </a:xfrm>
+          <a:prstGeom prst="rect">
+            <a:avLst/>
+          </a:prstGeom>
+          <a:noFill/>
+        </p:spPr>
+        <p:txBody>
+          <a:bodyPr wrap="square" rtlCol="0">
+            <a:spAutoFit/>
+          </a:bodyPr>
+          <a:lstStyle>
+            <a:lvl1pPr marL="319088" indent="-319088" algn="l" rtl="0" eaLnBrk="0" fontAlgn="base" hangingPunct="0">
+              <a:spcBef>
+                <a:spcPct val="20000"/>
+              </a:spcBef>
+              <a:spcAft>
+                <a:spcPct val="0"/>
+              </a:spcAft>
+              <a:buClr>
+                <a:schemeClr val="accent5">
+                  <a:lumMod val="40000"/>
+                  <a:lumOff val="60000"/>
+                </a:schemeClr>
+              </a:buClr>
+              <a:buSzPct val="70000"/>
+              <a:buFont typeface="Wingdings 2" pitchFamily="18" charset="2"/>
+              <a:buNone/>
+              <a:defRPr lang="en-US" sz="1800" b="1" kern="1200" dirty="0">
+                <a:solidFill>
+                  <a:schemeClr val="tx2">
+                    <a:lumMod val="20000"/>
+                    <a:lumOff val="80000"/>
+                  </a:schemeClr>
+                </a:solidFill>
+                <a:effectLst>
+                  <a:outerShdw blurRad="38100" dist="38100" dir="2700000" algn="tl">
+                    <a:srgbClr val="000000">
+                      <a:alpha val="43137"/>
+                    </a:srgbClr>
+                  </a:outerShdw>
+                </a:effectLst>
+                <a:latin typeface="Corbel" pitchFamily="34" charset="0"/>
+                <a:ea typeface="+mn-ea"/>
+                <a:cs typeface="+mn-cs"/>
+              </a:defRPr>
+            </a:lvl1pPr>
+            <a:lvl2pPr marL="630238" indent="-273050" algn="l" rtl="0" eaLnBrk="0" fontAlgn="base" hangingPunct="0">
+              <a:spcBef>
+                <a:spcPct val="20000"/>
+              </a:spcBef>
+              <a:spcAft>
+                <a:spcPct val="0"/>
+              </a:spcAft>
+              <a:buClr>
+                <a:schemeClr val="accent2">
+                  <a:lumMod val="60000"/>
+                  <a:lumOff val="40000"/>
+                </a:schemeClr>
+              </a:buClr>
+              <a:buFont typeface="Wingdings 2" pitchFamily="18" charset="2"/>
+              <a:buChar char=""/>
+              <a:defRPr sz="3000" b="1" kern="1200">
+                <a:solidFill>
+                  <a:schemeClr val="tx1">
+                    <a:lumMod val="20000"/>
+                    <a:lumOff val="80000"/>
+                  </a:schemeClr>
+                </a:solidFill>
+                <a:effectLst>
+                  <a:outerShdw blurRad="38100" dist="38100" dir="2700000" algn="tl">
+                    <a:srgbClr val="000000">
+                      <a:alpha val="43137"/>
+                    </a:srgbClr>
+                  </a:outerShdw>
+                </a:effectLst>
+                <a:latin typeface="+mn-lt"/>
+                <a:ea typeface="+mn-ea"/>
+                <a:cs typeface="+mn-cs"/>
+              </a:defRPr>
+            </a:lvl2pPr>
+            <a:lvl3pPr marL="922338" indent="-273050" algn="l" rtl="0" eaLnBrk="0" fontAlgn="base" hangingPunct="0">
+              <a:spcBef>
+                <a:spcPct val="20000"/>
+              </a:spcBef>
+              <a:spcAft>
+                <a:spcPct val="0"/>
+              </a:spcAft>
+              <a:buClr>
+                <a:schemeClr val="tx1">
+                  <a:lumMod val="50000"/>
+                </a:schemeClr>
+              </a:buClr>
+              <a:buFont typeface="Wingdings 2" pitchFamily="18" charset="2"/>
+              <a:buChar char=""/>
+              <a:defRPr sz="2800" b="1" kern="1200">
+                <a:solidFill>
+                  <a:schemeClr val="tx1">
+                    <a:lumMod val="20000"/>
+                    <a:lumOff val="80000"/>
+                  </a:schemeClr>
+                </a:solidFill>
+                <a:effectLst>
+                  <a:outerShdw blurRad="38100" dist="38100" dir="2700000" algn="tl">
+                    <a:srgbClr val="000000">
+                      <a:alpha val="43137"/>
+                    </a:srgbClr>
+                  </a:outerShdw>
+                </a:effectLst>
+                <a:latin typeface="+mn-lt"/>
+                <a:ea typeface="+mn-ea"/>
+                <a:cs typeface="+mn-cs"/>
+              </a:defRPr>
+            </a:lvl3pPr>
+            <a:lvl4pPr marL="1187450" indent="-228600" algn="l" rtl="0" eaLnBrk="0" fontAlgn="base" hangingPunct="0">
+              <a:spcBef>
+                <a:spcPct val="20000"/>
+              </a:spcBef>
+              <a:spcAft>
+                <a:spcPct val="0"/>
+              </a:spcAft>
+              <a:buClr>
+                <a:srgbClr val="F8BD52"/>
+              </a:buClr>
+              <a:buFont typeface="Wingdings 2" pitchFamily="18" charset="2"/>
+              <a:buChar char=""/>
+              <a:defRPr sz="2600" b="1" kern="1200">
+                <a:solidFill>
+                  <a:schemeClr val="tx1">
+                    <a:lumMod val="20000"/>
+                    <a:lumOff val="80000"/>
+                  </a:schemeClr>
+                </a:solidFill>
+                <a:effectLst>
+                  <a:outerShdw blurRad="38100" dist="38100" dir="2700000" algn="tl">
+                    <a:srgbClr val="000000">
+                      <a:alpha val="43137"/>
+                    </a:srgbClr>
+                  </a:outerShdw>
+                </a:effectLst>
+                <a:latin typeface="+mn-lt"/>
+                <a:ea typeface="+mn-ea"/>
+                <a:cs typeface="+mn-cs"/>
+              </a:defRPr>
+            </a:lvl4pPr>
+            <a:lvl5pPr marL="1425575" indent="-228600" algn="l" rtl="0" eaLnBrk="0" fontAlgn="base" hangingPunct="0">
+              <a:spcBef>
+                <a:spcPct val="20000"/>
+              </a:spcBef>
+              <a:spcAft>
+                <a:spcPct val="0"/>
+              </a:spcAft>
+              <a:buClr>
+                <a:srgbClr val="46A6BD"/>
+              </a:buClr>
+              <a:buFont typeface="Wingdings 2" pitchFamily="18" charset="2"/>
+              <a:buChar char=""/>
+              <a:defRPr sz="2400" b="1" kern="1200">
+                <a:solidFill>
+                  <a:schemeClr val="tx1">
+                    <a:lumMod val="20000"/>
+                    <a:lumOff val="80000"/>
+                  </a:schemeClr>
+                </a:solidFill>
+                <a:effectLst>
+                  <a:outerShdw blurRad="38100" dist="38100" dir="2700000" algn="tl">
+                    <a:srgbClr val="000000">
+                      <a:alpha val="43137"/>
+                    </a:srgbClr>
+                  </a:outerShdw>
+                </a:effectLst>
+                <a:latin typeface="+mn-lt"/>
+                <a:ea typeface="+mn-ea"/>
+                <a:cs typeface="+mn-cs"/>
+              </a:defRPr>
+            </a:lvl5pPr>
+            <a:lvl6pPr marL="1673352" indent="-228600" algn="l" rtl="0" eaLnBrk="1" latinLnBrk="0" hangingPunct="1">
+              <a:spcBef>
+                <a:spcPct val="20000"/>
+              </a:spcBef>
+              <a:buClr>
+                <a:schemeClr val="accent6"/>
+              </a:buClr>
+              <a:buFont typeface="Wingdings 2"/>
+              <a:buChar char=""/>
+              <a:defRPr sz="1800" kern="1200">
+                <a:solidFill>
+                  <a:schemeClr val="tx1"/>
+                </a:solidFill>
+                <a:latin typeface="+mn-lt"/>
+                <a:ea typeface="+mn-ea"/>
+                <a:cs typeface="+mn-cs"/>
+              </a:defRPr>
+            </a:lvl6pPr>
+            <a:lvl7pPr marL="1911096" indent="-228600" algn="l" rtl="0" eaLnBrk="1" latinLnBrk="0" hangingPunct="1">
+              <a:spcBef>
+                <a:spcPct val="20000"/>
+              </a:spcBef>
+              <a:buClr>
+                <a:schemeClr val="tx2"/>
+              </a:buClr>
+              <a:buFont typeface="Wingdings 2"/>
+              <a:buChar char=""/>
+              <a:defRPr sz="1600" kern="1200">
+                <a:solidFill>
+                  <a:schemeClr val="tx1"/>
+                </a:solidFill>
+                <a:latin typeface="+mn-lt"/>
+                <a:ea typeface="+mn-ea"/>
+                <a:cs typeface="+mn-cs"/>
+              </a:defRPr>
+            </a:lvl7pPr>
+            <a:lvl8pPr marL="2121408" indent="-182880" algn="l" rtl="0" eaLnBrk="1" latinLnBrk="0" hangingPunct="1">
+              <a:spcBef>
+                <a:spcPct val="20000"/>
+              </a:spcBef>
+              <a:buClr>
+                <a:schemeClr val="tx2"/>
+              </a:buClr>
+              <a:buFont typeface="Wingdings 2"/>
+              <a:buChar char=""/>
+              <a:defRPr sz="1400" kern="1200">
+                <a:solidFill>
+                  <a:schemeClr val="tx1"/>
+                </a:solidFill>
+                <a:latin typeface="+mn-lt"/>
+                <a:ea typeface="+mn-ea"/>
+                <a:cs typeface="+mn-cs"/>
+              </a:defRPr>
+            </a:lvl8pPr>
+            <a:lvl9pPr marL="2322576" indent="-182880" algn="l" rtl="0" eaLnBrk="1" latinLnBrk="0" hangingPunct="1">
+              <a:spcBef>
+                <a:spcPct val="20000"/>
+              </a:spcBef>
+              <a:buClr>
+                <a:schemeClr val="tx2"/>
+              </a:buClr>
+              <a:buFont typeface="Wingdings 2"/>
+              <a:buChar char=""/>
+              <a:defRPr sz="1400" kern="1200">
+                <a:solidFill>
+                  <a:schemeClr val="tx1"/>
+                </a:solidFill>
+                <a:latin typeface="+mn-lt"/>
+                <a:ea typeface="+mn-ea"/>
+                <a:cs typeface="+mn-cs"/>
+              </a:defRPr>
+            </a:lvl9pPr>
+          </a:lstStyle>
+          <a:p>
+            <a:r>
+              <a:rPr lang="en-US" dirty="0" smtClean="0">
+                <a:hlinkClick r:id="rId8"/>
+              </a:rPr>
+              <a:t>http://academy.telerik.com</a:t>
+            </a:r>
+            <a:r>
+              <a:rPr lang="en-US" dirty="0" smtClean="0"/>
+              <a:t> </a:t>
+            </a:r>
+            <a:endParaRPr lang="en-US" dirty="0"/>
+          </a:p>
+        </p:txBody>
+      </p:sp>
+      <p:sp>
+        <p:nvSpPr>
+          <p:cNvPr id="22" name="Text Placeholder 13"/>
+          <p:cNvSpPr>
+            <a:spLocks noGrp="1"/>
+          </p:cNvSpPr>
+          <p:nvPr/>
+        </p:nvSpPr>
+        <p:spPr>
+          <a:xfrm>
+            <a:off x="429087" y="5352025"/>
+            <a:ext cx="3990513" cy="461665"/>
+          </a:xfrm>
+          <a:prstGeom prst="rect">
+            <a:avLst/>
+          </a:prstGeom>
+          <a:noFill/>
+        </p:spPr>
+        <p:txBody>
+          <a:bodyPr wrap="square" rtlCol="0">
+            <a:spAutoFit/>
+          </a:bodyPr>
+          <a:lstStyle>
+            <a:lvl1pPr marL="0" indent="0" algn="l" rtl="0" eaLnBrk="0" fontAlgn="base" hangingPunct="0">
+              <a:spcBef>
+                <a:spcPct val="20000"/>
+              </a:spcBef>
+              <a:spcAft>
+                <a:spcPct val="0"/>
+              </a:spcAft>
+              <a:buClr>
+                <a:schemeClr val="accent5">
+                  <a:lumMod val="40000"/>
+                  <a:lumOff val="60000"/>
+                </a:schemeClr>
+              </a:buClr>
+              <a:buSzPct val="70000"/>
+              <a:buFont typeface="Wingdings 2" pitchFamily="18" charset="2"/>
+              <a:buNone/>
+              <a:defRPr lang="en-US" sz="2400" b="1" kern="1200" dirty="0">
+                <a:solidFill>
+                  <a:schemeClr val="tx2">
+                    <a:lumMod val="50000"/>
+                  </a:schemeClr>
+                </a:solidFill>
+                <a:effectLst>
+                  <a:outerShdw blurRad="38100" dist="38100" dir="2700000" algn="tl">
+                    <a:srgbClr val="000000">
+                      <a:alpha val="43137"/>
+                    </a:srgbClr>
+                  </a:outerShdw>
+                </a:effectLst>
+                <a:latin typeface="Corbel" pitchFamily="34" charset="0"/>
+                <a:ea typeface="+mn-ea"/>
+                <a:cs typeface="+mn-cs"/>
+              </a:defRPr>
+            </a:lvl1pPr>
+            <a:lvl2pPr marL="630238" indent="-273050" algn="l" rtl="0" eaLnBrk="0" fontAlgn="base" hangingPunct="0">
+              <a:spcBef>
+                <a:spcPct val="20000"/>
+              </a:spcBef>
+              <a:spcAft>
+                <a:spcPct val="0"/>
+              </a:spcAft>
+              <a:buClr>
+                <a:schemeClr val="accent2">
+                  <a:lumMod val="60000"/>
+                  <a:lumOff val="40000"/>
+                </a:schemeClr>
+              </a:buClr>
+              <a:buFont typeface="Wingdings 2" pitchFamily="18" charset="2"/>
+              <a:buChar char=""/>
+              <a:defRPr sz="3000" b="1" kern="1200">
+                <a:solidFill>
+                  <a:schemeClr val="tx1">
+                    <a:lumMod val="20000"/>
+                    <a:lumOff val="80000"/>
+                  </a:schemeClr>
+                </a:solidFill>
+                <a:effectLst>
+                  <a:outerShdw blurRad="38100" dist="38100" dir="2700000" algn="tl">
+                    <a:srgbClr val="000000">
+                      <a:alpha val="43137"/>
+                    </a:srgbClr>
+                  </a:outerShdw>
+                </a:effectLst>
+                <a:latin typeface="+mn-lt"/>
+                <a:ea typeface="+mn-ea"/>
+                <a:cs typeface="+mn-cs"/>
+              </a:defRPr>
+            </a:lvl2pPr>
+            <a:lvl3pPr marL="922338" indent="-273050" algn="l" rtl="0" eaLnBrk="0" fontAlgn="base" hangingPunct="0">
+              <a:spcBef>
+                <a:spcPct val="20000"/>
+              </a:spcBef>
+              <a:spcAft>
+                <a:spcPct val="0"/>
+              </a:spcAft>
+              <a:buClr>
+                <a:schemeClr val="tx1">
+                  <a:lumMod val="50000"/>
+                </a:schemeClr>
+              </a:buClr>
+              <a:buFont typeface="Wingdings 2" pitchFamily="18" charset="2"/>
+              <a:buChar char=""/>
+              <a:defRPr sz="2800" b="1" kern="1200">
+                <a:solidFill>
+                  <a:schemeClr val="tx1">
+                    <a:lumMod val="20000"/>
+                    <a:lumOff val="80000"/>
+                  </a:schemeClr>
+                </a:solidFill>
+                <a:effectLst>
+                  <a:outerShdw blurRad="38100" dist="38100" dir="2700000" algn="tl">
+                    <a:srgbClr val="000000">
+                      <a:alpha val="43137"/>
+                    </a:srgbClr>
+                  </a:outerShdw>
+                </a:effectLst>
+                <a:latin typeface="+mn-lt"/>
+                <a:ea typeface="+mn-ea"/>
+                <a:cs typeface="+mn-cs"/>
+              </a:defRPr>
+            </a:lvl3pPr>
+            <a:lvl4pPr marL="1187450" indent="-228600" algn="l" rtl="0" eaLnBrk="0" fontAlgn="base" hangingPunct="0">
+              <a:spcBef>
+                <a:spcPct val="20000"/>
+              </a:spcBef>
+              <a:spcAft>
+                <a:spcPct val="0"/>
+              </a:spcAft>
+              <a:buClr>
+                <a:srgbClr val="F8BD52"/>
+              </a:buClr>
+              <a:buFont typeface="Wingdings 2" pitchFamily="18" charset="2"/>
+              <a:buChar char=""/>
+              <a:defRPr sz="2600" b="1" kern="1200">
+                <a:solidFill>
+                  <a:schemeClr val="tx1">
+                    <a:lumMod val="20000"/>
+                    <a:lumOff val="80000"/>
+                  </a:schemeClr>
+                </a:solidFill>
+                <a:effectLst>
+                  <a:outerShdw blurRad="38100" dist="38100" dir="2700000" algn="tl">
+                    <a:srgbClr val="000000">
+                      <a:alpha val="43137"/>
+                    </a:srgbClr>
+                  </a:outerShdw>
+                </a:effectLst>
+                <a:latin typeface="+mn-lt"/>
+                <a:ea typeface="+mn-ea"/>
+                <a:cs typeface="+mn-cs"/>
+              </a:defRPr>
+            </a:lvl4pPr>
+            <a:lvl5pPr marL="1425575" indent="-228600" algn="l" rtl="0" eaLnBrk="0" fontAlgn="base" hangingPunct="0">
+              <a:spcBef>
+                <a:spcPct val="20000"/>
+              </a:spcBef>
+              <a:spcAft>
+                <a:spcPct val="0"/>
+              </a:spcAft>
+              <a:buClr>
+                <a:srgbClr val="46A6BD"/>
+              </a:buClr>
+              <a:buFont typeface="Wingdings 2" pitchFamily="18" charset="2"/>
+              <a:buChar char=""/>
+              <a:defRPr sz="2400" b="1" kern="1200">
+                <a:solidFill>
+                  <a:schemeClr val="tx1">
+                    <a:lumMod val="20000"/>
+                    <a:lumOff val="80000"/>
+                  </a:schemeClr>
+                </a:solidFill>
+                <a:effectLst>
+                  <a:outerShdw blurRad="38100" dist="38100" dir="2700000" algn="tl">
+                    <a:srgbClr val="000000">
+                      <a:alpha val="43137"/>
+                    </a:srgbClr>
+                  </a:outerShdw>
+                </a:effectLst>
+                <a:latin typeface="+mn-lt"/>
+                <a:ea typeface="+mn-ea"/>
+                <a:cs typeface="+mn-cs"/>
+              </a:defRPr>
+            </a:lvl5pPr>
+            <a:lvl6pPr marL="1673352" indent="-228600" algn="l" rtl="0" eaLnBrk="1" latinLnBrk="0" hangingPunct="1">
+              <a:spcBef>
+                <a:spcPct val="20000"/>
+              </a:spcBef>
+              <a:buClr>
+                <a:schemeClr val="accent6"/>
+              </a:buClr>
+              <a:buFont typeface="Wingdings 2"/>
+              <a:buChar char=""/>
+              <a:defRPr sz="1800" kern="1200">
+                <a:solidFill>
+                  <a:schemeClr val="tx1"/>
+                </a:solidFill>
+                <a:latin typeface="+mn-lt"/>
+                <a:ea typeface="+mn-ea"/>
+                <a:cs typeface="+mn-cs"/>
+              </a:defRPr>
+            </a:lvl6pPr>
+            <a:lvl7pPr marL="1911096" indent="-228600" algn="l" rtl="0" eaLnBrk="1" latinLnBrk="0" hangingPunct="1">
+              <a:spcBef>
+                <a:spcPct val="20000"/>
+              </a:spcBef>
+              <a:buClr>
+                <a:schemeClr val="tx2"/>
+              </a:buClr>
+              <a:buFont typeface="Wingdings 2"/>
+              <a:buChar char=""/>
+              <a:defRPr sz="1600" kern="1200">
+                <a:solidFill>
+                  <a:schemeClr val="tx1"/>
+                </a:solidFill>
+                <a:latin typeface="+mn-lt"/>
+                <a:ea typeface="+mn-ea"/>
+                <a:cs typeface="+mn-cs"/>
+              </a:defRPr>
+            </a:lvl7pPr>
+            <a:lvl8pPr marL="2121408" indent="-182880" algn="l" rtl="0" eaLnBrk="1" latinLnBrk="0" hangingPunct="1">
+              <a:spcBef>
+                <a:spcPct val="20000"/>
+              </a:spcBef>
+              <a:buClr>
+                <a:schemeClr val="tx2"/>
+              </a:buClr>
+              <a:buFont typeface="Wingdings 2"/>
+              <a:buChar char=""/>
+              <a:defRPr sz="1400" kern="1200">
+                <a:solidFill>
+                  <a:schemeClr val="tx1"/>
+                </a:solidFill>
+                <a:latin typeface="+mn-lt"/>
+                <a:ea typeface="+mn-ea"/>
+                <a:cs typeface="+mn-cs"/>
+              </a:defRPr>
+            </a:lvl8pPr>
+            <a:lvl9pPr marL="2322576" indent="-182880" algn="l" rtl="0" eaLnBrk="1" latinLnBrk="0" hangingPunct="1">
+              <a:spcBef>
+                <a:spcPct val="20000"/>
+              </a:spcBef>
+              <a:buClr>
+                <a:schemeClr val="tx2"/>
+              </a:buClr>
+              <a:buFont typeface="Wingdings 2"/>
+              <a:buChar char=""/>
+              <a:defRPr sz="1400" kern="1200">
+                <a:solidFill>
+                  <a:schemeClr val="tx1"/>
+                </a:solidFill>
+                <a:latin typeface="+mn-lt"/>
+                <a:ea typeface="+mn-ea"/>
+                <a:cs typeface="+mn-cs"/>
+              </a:defRPr>
+            </a:lvl9pPr>
+          </a:lstStyle>
+          <a:p>
+            <a:r>
+              <a:rPr lang="en-US" dirty="0" smtClean="0"/>
+              <a:t>Databases</a:t>
+            </a:r>
+            <a:endParaRPr lang="en-US" dirty="0"/>
           </a:p>
         </p:txBody>
       </p:sp>
@@ -8296,15 +9136,11 @@
                   </a:schemeClr>
                 </a:solidFill>
               </a:rPr>
-              <a:t>Loops Join </a:t>
-            </a:r>
-            <a:r>
-              <a:rPr lang="en-US" sz="2800" dirty="0"/>
-              <a:t>– </a:t>
+              <a:t>Loops </a:t>
             </a:r>
             <a:r>
               <a:rPr lang="en-US" sz="2800" dirty="0" smtClean="0"/>
-              <a:t>O (n*m) operation</a:t>
+              <a:t>– O (n*m) operation</a:t>
             </a:r>
             <a:endParaRPr lang="en-US" sz="3000" dirty="0" smtClean="0">
               <a:solidFill>
@@ -9722,7 +10558,7 @@
         </p:nvSpPr>
         <p:spPr>
           <a:xfrm>
-            <a:off x="228600" y="980728"/>
+            <a:off x="228600" y="836712"/>
             <a:ext cx="8686800" cy="5724872"/>
           </a:xfrm>
         </p:spPr>
@@ -9730,6 +10566,14 @@
           <a:bodyPr/>
           <a:lstStyle/>
           <a:p>
+            <a:pPr>
+              <a:spcBef>
+                <a:spcPts val="300"/>
+              </a:spcBef>
+              <a:spcAft>
+                <a:spcPts val="300"/>
+              </a:spcAft>
+            </a:pPr>
             <a:r>
               <a:rPr lang="en-US" dirty="0">
                 <a:solidFill>
@@ -9751,7 +10595,14 @@
             </a:r>
           </a:p>
           <a:p>
-            <a:pPr lvl="1"/>
+            <a:pPr lvl="1">
+              <a:spcBef>
+                <a:spcPts val="300"/>
+              </a:spcBef>
+              <a:spcAft>
+                <a:spcPts val="300"/>
+              </a:spcAft>
+            </a:pPr>
             <a:r>
               <a:rPr lang="en-US" dirty="0" smtClean="0"/>
               <a:t>An index built-in the table as B-tree – very fast!</a:t>
@@ -9759,7 +10610,14 @@
             <a:endParaRPr lang="en-US" dirty="0"/>
           </a:p>
           <a:p>
-            <a:pPr lvl="1"/>
+            <a:pPr lvl="1">
+              <a:spcBef>
+                <a:spcPts val="300"/>
+              </a:spcBef>
+              <a:spcAft>
+                <a:spcPts val="300"/>
+              </a:spcAft>
+            </a:pPr>
             <a:r>
               <a:rPr lang="en-US" sz="2800" dirty="0"/>
               <a:t>A </a:t>
@@ -9816,7 +10674,14 @@
             <a:endParaRPr lang="en-US" sz="2800" dirty="0"/>
           </a:p>
           <a:p>
-            <a:pPr lvl="1"/>
+            <a:pPr lvl="1">
+              <a:spcBef>
+                <a:spcPts val="300"/>
+              </a:spcBef>
+              <a:spcAft>
+                <a:spcPts val="300"/>
+              </a:spcAft>
+            </a:pPr>
             <a:r>
               <a:rPr lang="en-US" dirty="0" smtClean="0"/>
               <a:t>Highly </a:t>
@@ -9827,17 +10692,24 @@
             </a:r>
           </a:p>
           <a:p>
-            <a:pPr lvl="1"/>
+            <a:pPr lvl="1">
+              <a:spcBef>
+                <a:spcPts val="300"/>
+              </a:spcBef>
+              <a:spcAft>
+                <a:spcPts val="300"/>
+              </a:spcAft>
+            </a:pPr>
             <a:r>
               <a:rPr lang="en-US" dirty="0"/>
               <a:t>Very useful </a:t>
             </a:r>
             <a:r>
               <a:rPr lang="en-US" dirty="0" smtClean="0"/>
-              <a:t>for fast execution of </a:t>
-            </a:r>
-            <a:r>
-              <a:rPr lang="en-US" dirty="0" smtClean="0">
+              <a:t>for fast execution of</a:t>
+            </a:r>
+            <a:r>
+              <a:rPr lang="en-US" dirty="0">
                 <a:solidFill>
                   <a:schemeClr val="accent5">
                     <a:lumMod val="20000"/>
@@ -9845,7 +10717,7 @@
                   </a:schemeClr>
                 </a:solidFill>
               </a:rPr>
-              <a:t>WHERE</a:t>
+              <a:t> WHERE</a:t>
             </a:r>
             <a:r>
               <a:rPr lang="en-US" dirty="0" smtClean="0"/>
@@ -9925,6 +10797,14 @@
             <a:endParaRPr lang="en-US" dirty="0" smtClean="0"/>
           </a:p>
           <a:p>
+            <a:pPr>
+              <a:spcBef>
+                <a:spcPts val="300"/>
+              </a:spcBef>
+              <a:spcAft>
+                <a:spcPts val="300"/>
+              </a:spcAft>
+            </a:pPr>
             <a:r>
               <a:rPr lang="en-US" sz="3400" dirty="0"/>
               <a:t>Maximum </a:t>
@@ -9944,7 +10824,25 @@
               <a:rPr lang="en-US" sz="3400" dirty="0" smtClean="0"/>
               <a:t>table</a:t>
             </a:r>
-            <a:endParaRPr lang="en-US" sz="4000" dirty="0"/>
+          </a:p>
+          <a:p>
+            <a:pPr lvl="1">
+              <a:spcBef>
+                <a:spcPts val="300"/>
+              </a:spcBef>
+              <a:spcAft>
+                <a:spcPts val="300"/>
+              </a:spcAft>
+            </a:pPr>
+            <a:r>
+              <a:rPr lang="en-US" dirty="0"/>
+              <a:t>If a table has no clustered index, its data rows are stored in an unordered structure </a:t>
+            </a:r>
+            <a:r>
+              <a:rPr lang="en-US" dirty="0" smtClean="0"/>
+              <a:t>(heap)</a:t>
+            </a:r>
+            <a:endParaRPr lang="en-US" dirty="0"/>
           </a:p>
         </p:txBody>
       </p:sp>
@@ -11372,40 +12270,139 @@
         </p:nvSpPr>
         <p:spPr>
           <a:xfrm>
-            <a:off x="179512" y="914400"/>
-            <a:ext cx="8712968" cy="5715000"/>
+            <a:off x="179512" y="800500"/>
+            <a:ext cx="8712968" cy="5904656"/>
           </a:xfrm>
         </p:spPr>
         <p:txBody>
           <a:bodyPr/>
           <a:lstStyle/>
           <a:p>
+            <a:pPr>
+              <a:spcBef>
+                <a:spcPts val="0"/>
+              </a:spcBef>
+              <a:spcAft>
+                <a:spcPts val="0"/>
+              </a:spcAft>
+            </a:pPr>
             <a:r>
               <a:rPr lang="en-US" dirty="0" smtClean="0"/>
               <a:t>Adding non-clustered indexes to a table can greatly speed-up SELECT statements</a:t>
             </a:r>
           </a:p>
           <a:p>
+            <a:pPr>
+              <a:spcBef>
+                <a:spcPts val="0"/>
+              </a:spcBef>
+              <a:spcAft>
+                <a:spcPts val="0"/>
+              </a:spcAft>
+            </a:pPr>
             <a:r>
               <a:rPr lang="en-US" dirty="0" smtClean="0"/>
               <a:t>Every index has a certain amount of overhead</a:t>
             </a:r>
           </a:p>
           <a:p>
-            <a:pPr lvl="1"/>
+            <a:pPr lvl="1">
+              <a:spcBef>
+                <a:spcPts val="0"/>
+              </a:spcBef>
+              <a:spcAft>
+                <a:spcPts val="0"/>
+              </a:spcAft>
+            </a:pPr>
             <a:r>
               <a:rPr lang="en-US" sz="2800" dirty="0" smtClean="0"/>
               <a:t>The greater the number of indexes, the more overhead with every INSERT, UPDATE, and DELETE statements</a:t>
             </a:r>
-          </a:p>
-          <a:p>
+            <a:endParaRPr lang="en-US" sz="2600" dirty="0" smtClean="0"/>
+          </a:p>
+          <a:p>
+            <a:pPr>
+              <a:spcBef>
+                <a:spcPts val="0"/>
+              </a:spcBef>
+              <a:spcAft>
+                <a:spcPts val="0"/>
+              </a:spcAft>
+            </a:pPr>
             <a:r>
               <a:rPr lang="en-US" dirty="0" smtClean="0"/>
               <a:t>Must balance the needs of the application with the pros and cons of added indexes</a:t>
             </a:r>
           </a:p>
           <a:p>
-            <a:pPr lvl="1"/>
+            <a:pPr lvl="1">
+              <a:spcBef>
+                <a:spcPts val="0"/>
+              </a:spcBef>
+              <a:spcAft>
+                <a:spcPts val="0"/>
+              </a:spcAft>
+            </a:pPr>
+            <a:r>
+              <a:rPr lang="en-US" dirty="0"/>
+              <a:t>OLTP </a:t>
+            </a:r>
+            <a:r>
+              <a:rPr lang="en-US" dirty="0">
+                <a:sym typeface="Wingdings" panose="05000000000000000000" pitchFamily="2" charset="2"/>
+              </a:rPr>
+              <a:t> less indexes (more modify, less read)</a:t>
+            </a:r>
+          </a:p>
+          <a:p>
+            <a:pPr lvl="2">
+              <a:spcBef>
+                <a:spcPts val="0"/>
+              </a:spcBef>
+              <a:spcAft>
+                <a:spcPts val="0"/>
+              </a:spcAft>
+            </a:pPr>
+            <a:r>
+              <a:rPr lang="en-US" dirty="0">
+                <a:solidFill>
+                  <a:schemeClr val="tx1">
+                    <a:lumMod val="40000"/>
+                    <a:lumOff val="60000"/>
+                  </a:schemeClr>
+                </a:solidFill>
+              </a:rPr>
+              <a:t>Online Transaction Processing </a:t>
+            </a:r>
+            <a:r>
+              <a:rPr lang="en-US" dirty="0" smtClean="0">
+                <a:solidFill>
+                  <a:schemeClr val="tx1">
+                    <a:lumMod val="40000"/>
+                    <a:lumOff val="60000"/>
+                  </a:schemeClr>
+                </a:solidFill>
+              </a:rPr>
+              <a:t>(Standard DB)</a:t>
+            </a:r>
+            <a:endParaRPr lang="en-US" dirty="0">
+              <a:solidFill>
+                <a:schemeClr val="tx1">
+                  <a:lumMod val="40000"/>
+                  <a:lumOff val="60000"/>
+                </a:schemeClr>
+              </a:solidFill>
+            </a:endParaRPr>
+          </a:p>
+          <a:p>
+            <a:pPr lvl="1">
+              <a:spcBef>
+                <a:spcPts val="0"/>
+              </a:spcBef>
+              <a:spcAft>
+                <a:spcPts val="0"/>
+              </a:spcAft>
+            </a:pPr>
             <a:r>
               <a:rPr lang="en-US" dirty="0" smtClean="0"/>
               <a:t>OLAP </a:t>
@@ -11418,18 +12415,56 @@
             </a:r>
           </a:p>
           <a:p>
-            <a:pPr lvl="1"/>
-            <a:r>
-              <a:rPr lang="en-US" dirty="0" smtClean="0"/>
-              <a:t>OLTP </a:t>
+            <a:pPr lvl="2">
+              <a:spcBef>
+                <a:spcPts val="0"/>
+              </a:spcBef>
+              <a:spcAft>
+                <a:spcPts val="0"/>
+              </a:spcAft>
+            </a:pPr>
+            <a:r>
+              <a:rPr lang="en-US" dirty="0">
+                <a:solidFill>
+                  <a:schemeClr val="tx1">
+                    <a:lumMod val="40000"/>
+                    <a:lumOff val="60000"/>
+                  </a:schemeClr>
+                </a:solidFill>
+              </a:rPr>
+              <a:t>Online Analytical Processing </a:t>
             </a:r>
             <a:r>
               <a:rPr lang="en-US" dirty="0" smtClean="0">
-                <a:sym typeface="Wingdings" panose="05000000000000000000" pitchFamily="2" charset="2"/>
+                <a:solidFill>
+                  <a:schemeClr val="tx1">
+                    <a:lumMod val="40000"/>
+                    <a:lumOff val="60000"/>
+                  </a:schemeClr>
+                </a:solidFill>
               </a:rPr>
-              <a:t> less indexes (more modify, less read)</a:t>
-            </a:r>
-            <a:endParaRPr lang="en-US" dirty="0"/>
+              <a:t>(Data Warehouse</a:t>
+            </a:r>
+            <a:r>
+              <a:rPr lang="en-US" dirty="0">
+                <a:solidFill>
+                  <a:schemeClr val="tx1">
+                    <a:lumMod val="40000"/>
+                    <a:lumOff val="60000"/>
+                  </a:schemeClr>
+                </a:solidFill>
+              </a:rPr>
+              <a:t>)</a:t>
+            </a:r>
+            <a:endParaRPr lang="en-US" dirty="0">
+              <a:solidFill>
+                <a:schemeClr val="tx1">
+                  <a:lumMod val="40000"/>
+                  <a:lumOff val="60000"/>
+                </a:schemeClr>
+              </a:solidFill>
+              <a:sym typeface="Wingdings" panose="05000000000000000000" pitchFamily="2" charset="2"/>
+            </a:endParaRPr>
           </a:p>
         </p:txBody>
       </p:sp>
@@ -11504,7 +12539,7 @@
         </p:nvSpPr>
         <p:spPr>
           <a:xfrm>
-            <a:off x="228600" y="836712"/>
+            <a:off x="228600" y="764704"/>
             <a:ext cx="8686800" cy="5792688"/>
           </a:xfrm>
         </p:spPr>
@@ -11512,6 +12547,14 @@
           <a:bodyPr/>
           <a:lstStyle/>
           <a:p>
+            <a:pPr>
+              <a:spcBef>
+                <a:spcPts val="0"/>
+              </a:spcBef>
+              <a:spcAft>
+                <a:spcPts val="0"/>
+              </a:spcAft>
+            </a:pPr>
             <a:r>
               <a:rPr lang="en-US" dirty="0"/>
               <a:t>When SQL Server creates indexes, every page is nearly 100% </a:t>
@@ -11523,7 +12566,14 @@
             <a:endParaRPr lang="en-US" dirty="0"/>
           </a:p>
           <a:p>
-            <a:pPr lvl="1"/>
+            <a:pPr lvl="1">
+              <a:spcBef>
+                <a:spcPts val="0"/>
+              </a:spcBef>
+              <a:spcAft>
+                <a:spcPts val="0"/>
+              </a:spcAft>
+            </a:pPr>
             <a:r>
               <a:rPr lang="en-US" sz="2800" dirty="0"/>
               <a:t>No room on the </a:t>
@@ -11543,7 +12593,14 @@
             <a:endParaRPr lang="en-US" sz="2800" dirty="0"/>
           </a:p>
           <a:p>
-            <a:pPr lvl="1"/>
+            <a:pPr lvl="1">
+              <a:spcBef>
+                <a:spcPts val="0"/>
+              </a:spcBef>
+              <a:spcAft>
+                <a:spcPts val="0"/>
+              </a:spcAft>
+            </a:pPr>
             <a:r>
               <a:rPr lang="en-US" sz="2800" dirty="0" smtClean="0"/>
               <a:t>The default (100%) </a:t>
@@ -11559,7 +12616,14 @@
             <a:endParaRPr lang="en-US" sz="2800" dirty="0"/>
           </a:p>
           <a:p>
-            <a:pPr lvl="1"/>
+            <a:pPr lvl="1">
+              <a:spcBef>
+                <a:spcPts val="0"/>
+              </a:spcBef>
+              <a:spcAft>
+                <a:spcPts val="0"/>
+              </a:spcAft>
+            </a:pPr>
             <a:r>
               <a:rPr lang="en-US" sz="2800" dirty="0"/>
               <a:t>Promotes table </a:t>
@@ -11571,6 +12635,14 @@
             <a:endParaRPr lang="en-US" sz="2800" dirty="0"/>
           </a:p>
           <a:p>
+            <a:pPr>
+              <a:spcBef>
+                <a:spcPts val="0"/>
+              </a:spcBef>
+              <a:spcAft>
+                <a:spcPts val="0"/>
+              </a:spcAft>
+            </a:pPr>
             <a:r>
               <a:rPr lang="en-US" dirty="0" smtClean="0"/>
               <a:t>You can specify </a:t>
@@ -11608,7 +12680,14 @@
             </a:endParaRPr>
           </a:p>
           <a:p>
-            <a:pPr lvl="1"/>
+            <a:pPr lvl="1">
+              <a:spcBef>
+                <a:spcPts val="0"/>
+              </a:spcBef>
+              <a:spcAft>
+                <a:spcPts val="0"/>
+              </a:spcAft>
+            </a:pPr>
             <a:r>
               <a:rPr lang="en-US" dirty="0" smtClean="0"/>
               <a:t>An </a:t>
@@ -11639,14 +12718,36 @@
               </a:rPr>
               <a:t>INDEX</a:t>
             </a:r>
-            <a:endParaRPr lang="en-US" dirty="0">
-              <a:solidFill>
-                <a:schemeClr val="accent5">
-                  <a:lumMod val="20000"/>
-                  <a:lumOff val="80000"/>
-                </a:schemeClr>
-              </a:solidFill>
-            </a:endParaRPr>
+          </a:p>
+          <a:p>
+            <a:pPr lvl="1">
+              <a:spcBef>
+                <a:spcPts val="0"/>
+              </a:spcBef>
+              <a:spcAft>
+                <a:spcPts val="0"/>
+              </a:spcAft>
+            </a:pPr>
+            <a:r>
+              <a:rPr lang="en-US" dirty="0" smtClean="0"/>
+              <a:t>Small </a:t>
+            </a:r>
+            <a:r>
+              <a:rPr lang="en-US" dirty="0">
+                <a:solidFill>
+                  <a:schemeClr val="accent5">
+                    <a:lumMod val="20000"/>
+                    <a:lumOff val="80000"/>
+                  </a:schemeClr>
+                </a:solidFill>
+              </a:rPr>
+              <a:t>FILLFACTOR</a:t>
+            </a:r>
+            <a:r>
+              <a:rPr lang="en-US" dirty="0" smtClean="0"/>
+              <a:t> may cause performance issues – bigger pages = more data in cache</a:t>
+            </a:r>
+            <a:endParaRPr lang="en-US" dirty="0"/>
           </a:p>
         </p:txBody>
       </p:sp>
@@ -15319,11 +16420,7 @@
             </a:r>
             <a:r>
               <a:rPr lang="en-US" sz="2800" smtClean="0"/>
-              <a:t>with </a:t>
-            </a:r>
-            <a:r>
-              <a:rPr lang="en-US" sz="2800" smtClean="0"/>
-              <a:t>10 </a:t>
+              <a:t>with 10 </a:t>
             </a:r>
             <a:r>
               <a:rPr lang="en-US" sz="2800" dirty="0" smtClean="0"/>

</xml_diff>